<commit_message>
minor change to diagram width to fit on PDF docs page size
</commit_message>
<xml_diff>
--- a/doc/reference/src/images/Modules Diagram.pptx
+++ b/doc/reference/src/images/Modules Diagram.pptx
@@ -2531,8 +2531,8 @@
       </dsp:nvSpPr>
       <dsp:spPr>
         <a:xfrm>
-          <a:off x="2820" y="1770463"/>
-          <a:ext cx="5583117" cy="362145"/>
+          <a:off x="2500" y="1569061"/>
+          <a:ext cx="4947999" cy="320949"/>
         </a:xfrm>
         <a:prstGeom prst="roundRect">
           <a:avLst>
@@ -2599,12 +2599,12 @@
         </a:fontRef>
       </dsp:style>
       <dsp:txBody>
-        <a:bodyPr spcFirstLastPara="0" vert="horz" wrap="square" lIns="30480" tIns="30480" rIns="30480" bIns="30480" numCol="1" spcCol="1270" anchor="ctr" anchorCtr="0">
+        <a:bodyPr spcFirstLastPara="0" vert="horz" wrap="square" lIns="26670" tIns="26670" rIns="26670" bIns="26670" numCol="1" spcCol="1270" anchor="ctr" anchorCtr="0">
           <a:noAutofit/>
         </a:bodyPr>
         <a:lstStyle/>
         <a:p>
-          <a:pPr lvl="0" algn="ctr" defTabSz="355600">
+          <a:pPr lvl="0" algn="ctr" defTabSz="311150">
             <a:lnSpc>
               <a:spcPct val="90000"/>
             </a:lnSpc>
@@ -2616,12 +2616,12 @@
             </a:spcAft>
           </a:pPr>
           <a:r>
-            <a:rPr lang="en-US" sz="800" b="1" kern="1200" dirty="0" smtClean="0"/>
+            <a:rPr lang="en-US" sz="700" b="1" kern="1200" dirty="0" smtClean="0"/>
             <a:t>Core</a:t>
           </a:r>
         </a:p>
         <a:p>
-          <a:pPr lvl="0" algn="ctr" defTabSz="355600">
+          <a:pPr lvl="0" algn="ctr" defTabSz="311150">
             <a:lnSpc>
               <a:spcPct val="90000"/>
             </a:lnSpc>
@@ -2633,23 +2633,23 @@
             </a:spcAft>
           </a:pPr>
           <a:r>
-            <a:rPr lang="en-US" sz="800" b="1" kern="1200" dirty="0" smtClean="0"/>
+            <a:rPr lang="en-US" sz="700" b="1" kern="1200" dirty="0" smtClean="0"/>
             <a:t>(</a:t>
           </a:r>
           <a:r>
-            <a:rPr lang="en-US" sz="800" b="1" kern="1200" dirty="0" err="1" smtClean="0"/>
+            <a:rPr lang="en-US" sz="700" b="1" kern="1200" dirty="0" err="1" smtClean="0"/>
             <a:t>IoC</a:t>
           </a:r>
           <a:r>
-            <a:rPr lang="en-US" sz="800" b="1" kern="1200" dirty="0" smtClean="0"/>
+            <a:rPr lang="en-US" sz="700" b="1" kern="1200" dirty="0" smtClean="0"/>
             <a:t> Container and Base functionality)</a:t>
           </a:r>
-          <a:endParaRPr lang="en-US" sz="800" b="1" kern="1200" dirty="0"/>
+          <a:endParaRPr lang="en-US" sz="700" b="1" kern="1200" dirty="0"/>
         </a:p>
       </dsp:txBody>
       <dsp:txXfrm>
-        <a:off x="13427" y="1781070"/>
-        <a:ext cx="5561903" cy="340931"/>
+        <a:off x="11900" y="1578461"/>
+        <a:ext cx="4929199" cy="302149"/>
       </dsp:txXfrm>
     </dsp:sp>
     <dsp:sp modelId="{2211D5EC-7AE6-4794-9EEE-7C6066AC8F77}">
@@ -2659,8 +2659,8 @@
       </dsp:nvSpPr>
       <dsp:spPr>
         <a:xfrm>
-          <a:off x="8270" y="1305755"/>
-          <a:ext cx="5572217" cy="380352"/>
+          <a:off x="7329" y="1157217"/>
+          <a:ext cx="4938340" cy="337084"/>
         </a:xfrm>
         <a:prstGeom prst="roundRect">
           <a:avLst>
@@ -2727,12 +2727,12 @@
         </a:fontRef>
       </dsp:style>
       <dsp:txBody>
-        <a:bodyPr spcFirstLastPara="0" vert="horz" wrap="square" lIns="30480" tIns="30480" rIns="30480" bIns="30480" numCol="1" spcCol="1270" anchor="ctr" anchorCtr="0">
+        <a:bodyPr spcFirstLastPara="0" vert="horz" wrap="square" lIns="26670" tIns="26670" rIns="26670" bIns="26670" numCol="1" spcCol="1270" anchor="ctr" anchorCtr="0">
           <a:noAutofit/>
         </a:bodyPr>
         <a:lstStyle/>
         <a:p>
-          <a:pPr lvl="0" algn="ctr" defTabSz="355600">
+          <a:pPr lvl="0" algn="ctr" defTabSz="311150">
             <a:lnSpc>
               <a:spcPct val="90000"/>
             </a:lnSpc>
@@ -2744,12 +2744,12 @@
             </a:spcAft>
           </a:pPr>
           <a:r>
-            <a:rPr lang="en-US" sz="800" b="1" kern="1200" dirty="0" smtClean="0"/>
+            <a:rPr lang="en-US" sz="700" b="1" kern="1200" dirty="0" smtClean="0"/>
             <a:t>AOP</a:t>
           </a:r>
         </a:p>
         <a:p>
-          <a:pPr lvl="0" algn="ctr" defTabSz="355600">
+          <a:pPr lvl="0" algn="ctr" defTabSz="311150">
             <a:lnSpc>
               <a:spcPct val="90000"/>
             </a:lnSpc>
@@ -2761,15 +2761,15 @@
             </a:spcAft>
           </a:pPr>
           <a:r>
-            <a:rPr lang="en-US" sz="800" b="1" kern="1200" dirty="0" smtClean="0"/>
+            <a:rPr lang="en-US" sz="700" b="1" kern="1200" dirty="0" smtClean="0"/>
             <a:t>(AOP Model Support, Proxy Infrastructure, Aspect Library)</a:t>
           </a:r>
-          <a:endParaRPr lang="en-US" sz="800" b="1" kern="1200" dirty="0"/>
+          <a:endParaRPr lang="en-US" sz="700" b="1" kern="1200" dirty="0"/>
         </a:p>
       </dsp:txBody>
       <dsp:txXfrm>
-        <a:off x="19410" y="1316895"/>
-        <a:ext cx="5549937" cy="358072"/>
+        <a:off x="17202" y="1167090"/>
+        <a:ext cx="4918594" cy="317338"/>
       </dsp:txXfrm>
     </dsp:sp>
     <dsp:sp modelId="{2F3975C3-D631-4EF9-A7FB-C333A2832663}">
@@ -2779,8 +2779,8 @@
       </dsp:nvSpPr>
       <dsp:spPr>
         <a:xfrm>
-          <a:off x="19995" y="662861"/>
-          <a:ext cx="537481" cy="558538"/>
+          <a:off x="17720" y="587456"/>
+          <a:ext cx="476339" cy="495001"/>
         </a:xfrm>
         <a:prstGeom prst="roundRect">
           <a:avLst>
@@ -2847,12 +2847,12 @@
         </a:fontRef>
       </dsp:style>
       <dsp:txBody>
-        <a:bodyPr spcFirstLastPara="0" vert="horz" wrap="square" lIns="26670" tIns="26670" rIns="26670" bIns="26670" numCol="1" spcCol="1270" anchor="ctr" anchorCtr="0">
+        <a:bodyPr spcFirstLastPara="0" vert="horz" wrap="square" lIns="22860" tIns="22860" rIns="22860" bIns="22860" numCol="1" spcCol="1270" anchor="ctr" anchorCtr="0">
           <a:noAutofit/>
         </a:bodyPr>
         <a:lstStyle/>
         <a:p>
-          <a:pPr lvl="0" algn="ctr" defTabSz="311150">
+          <a:pPr lvl="0" algn="ctr" defTabSz="266700">
             <a:lnSpc>
               <a:spcPct val="90000"/>
             </a:lnSpc>
@@ -2864,12 +2864,12 @@
             </a:spcAft>
           </a:pPr>
           <a:r>
-            <a:rPr lang="en-US" sz="700" b="1" kern="1200" dirty="0" smtClean="0"/>
+            <a:rPr lang="en-US" sz="600" b="1" kern="1200" dirty="0" smtClean="0"/>
             <a:t>Data</a:t>
           </a:r>
         </a:p>
         <a:p>
-          <a:pPr lvl="0" algn="ctr" defTabSz="311150">
+          <a:pPr lvl="0" algn="ctr" defTabSz="266700">
             <a:lnSpc>
               <a:spcPct val="90000"/>
             </a:lnSpc>
@@ -2881,23 +2881,23 @@
             </a:spcAft>
           </a:pPr>
           <a:r>
-            <a:rPr lang="en-US" sz="700" b="1" kern="1200" dirty="0" smtClean="0"/>
+            <a:rPr lang="en-US" sz="600" b="1" kern="1200" dirty="0" smtClean="0"/>
             <a:t>(TX </a:t>
           </a:r>
           <a:r>
-            <a:rPr lang="en-US" sz="700" b="1" kern="1200" dirty="0" err="1" smtClean="0"/>
+            <a:rPr lang="en-US" sz="600" b="1" kern="1200" dirty="0" err="1" smtClean="0"/>
             <a:t>Mgt</a:t>
           </a:r>
           <a:r>
-            <a:rPr lang="en-US" sz="700" b="1" kern="1200" dirty="0" smtClean="0"/>
+            <a:rPr lang="en-US" sz="600" b="1" kern="1200" dirty="0" smtClean="0"/>
             <a:t>)</a:t>
           </a:r>
-          <a:endParaRPr lang="en-US" sz="700" b="1" kern="1200" dirty="0"/>
+          <a:endParaRPr lang="en-US" sz="600" b="1" kern="1200" dirty="0"/>
         </a:p>
       </dsp:txBody>
       <dsp:txXfrm>
-        <a:off x="35737" y="678603"/>
-        <a:ext cx="505997" cy="527054"/>
+        <a:off x="31671" y="601407"/>
+        <a:ext cx="448437" cy="467099"/>
       </dsp:txXfrm>
     </dsp:sp>
     <dsp:sp modelId="{C015DFF4-6D14-4908-8080-3693BAD55FD3}">
@@ -2907,8 +2907,8 @@
       </dsp:nvSpPr>
       <dsp:spPr>
         <a:xfrm>
-          <a:off x="19137" y="3434"/>
-          <a:ext cx="539195" cy="575071"/>
+          <a:off x="16960" y="3043"/>
+          <a:ext cx="477858" cy="509653"/>
         </a:xfrm>
         <a:prstGeom prst="roundRect">
           <a:avLst>
@@ -2975,12 +2975,12 @@
         </a:fontRef>
       </dsp:style>
       <dsp:txBody>
-        <a:bodyPr spcFirstLastPara="0" vert="horz" wrap="square" lIns="26670" tIns="26670" rIns="26670" bIns="26670" numCol="1" spcCol="1270" anchor="ctr" anchorCtr="0">
+        <a:bodyPr spcFirstLastPara="0" vert="horz" wrap="square" lIns="22860" tIns="22860" rIns="22860" bIns="22860" numCol="1" spcCol="1270" anchor="ctr" anchorCtr="0">
           <a:noAutofit/>
         </a:bodyPr>
         <a:lstStyle/>
         <a:p>
-          <a:pPr lvl="0" algn="ctr" defTabSz="311150">
+          <a:pPr lvl="0" algn="ctr" defTabSz="266700">
             <a:lnSpc>
               <a:spcPct val="90000"/>
             </a:lnSpc>
@@ -2992,15 +2992,15 @@
             </a:spcAft>
           </a:pPr>
           <a:r>
-            <a:rPr lang="en-US" sz="700" b="1" kern="1200" dirty="0" err="1" smtClean="0"/>
+            <a:rPr lang="en-US" sz="600" b="1" kern="1200" dirty="0" err="1" smtClean="0"/>
             <a:t>NHibernate</a:t>
           </a:r>
-          <a:endParaRPr lang="en-US" sz="700" b="1" kern="1200" dirty="0"/>
+          <a:endParaRPr lang="en-US" sz="600" b="1" kern="1200" dirty="0"/>
         </a:p>
       </dsp:txBody>
       <dsp:txXfrm>
-        <a:off x="34929" y="19226"/>
-        <a:ext cx="507611" cy="543487"/>
+        <a:off x="30956" y="17039"/>
+        <a:ext cx="449866" cy="481661"/>
       </dsp:txXfrm>
     </dsp:sp>
     <dsp:sp modelId="{6CB803F6-DDB5-41E0-B573-8A19C65B1347}">
@@ -3010,8 +3010,8 @@
       </dsp:nvSpPr>
       <dsp:spPr>
         <a:xfrm>
-          <a:off x="580980" y="660417"/>
-          <a:ext cx="1089715" cy="560982"/>
+          <a:off x="514889" y="585290"/>
+          <a:ext cx="965752" cy="497167"/>
         </a:xfrm>
         <a:prstGeom prst="roundRect">
           <a:avLst>
@@ -3078,12 +3078,12 @@
         </a:fontRef>
       </dsp:style>
       <dsp:txBody>
-        <a:bodyPr spcFirstLastPara="0" vert="horz" wrap="square" lIns="26670" tIns="26670" rIns="26670" bIns="26670" numCol="1" spcCol="1270" anchor="ctr" anchorCtr="0">
+        <a:bodyPr spcFirstLastPara="0" vert="horz" wrap="square" lIns="22860" tIns="22860" rIns="22860" bIns="22860" numCol="1" spcCol="1270" anchor="ctr" anchorCtr="0">
           <a:noAutofit/>
         </a:bodyPr>
         <a:lstStyle/>
         <a:p>
-          <a:pPr lvl="0" algn="ctr" defTabSz="311150">
+          <a:pPr lvl="0" algn="ctr" defTabSz="266700">
             <a:lnSpc>
               <a:spcPct val="90000"/>
             </a:lnSpc>
@@ -3095,12 +3095,12 @@
             </a:spcAft>
           </a:pPr>
           <a:r>
-            <a:rPr lang="en-US" sz="700" b="1" kern="1200" dirty="0" smtClean="0"/>
+            <a:rPr lang="en-US" sz="600" b="1" kern="1200" dirty="0" smtClean="0"/>
             <a:t>Messaging</a:t>
           </a:r>
         </a:p>
         <a:p>
-          <a:pPr lvl="0" algn="ctr" defTabSz="311150">
+          <a:pPr lvl="0" algn="ctr" defTabSz="266700">
             <a:lnSpc>
               <a:spcPct val="90000"/>
             </a:lnSpc>
@@ -3112,15 +3112,15 @@
             </a:spcAft>
           </a:pPr>
           <a:r>
-            <a:rPr lang="en-US" sz="700" b="1" kern="1200" dirty="0" smtClean="0"/>
+            <a:rPr lang="en-US" sz="600" b="1" kern="1200" dirty="0" smtClean="0"/>
             <a:t>(Microsoft MSMQ)</a:t>
           </a:r>
-          <a:endParaRPr lang="en-US" sz="700" b="1" kern="1200" dirty="0"/>
+          <a:endParaRPr lang="en-US" sz="600" b="1" kern="1200" dirty="0"/>
         </a:p>
       </dsp:txBody>
       <dsp:txXfrm>
-        <a:off x="597411" y="676848"/>
-        <a:ext cx="1056853" cy="528120"/>
+        <a:off x="529451" y="599852"/>
+        <a:ext cx="936628" cy="468043"/>
       </dsp:txXfrm>
     </dsp:sp>
     <dsp:sp modelId="{D7F06BE9-CB93-49FF-B857-5486A081752A}">
@@ -3130,8 +3130,8 @@
       </dsp:nvSpPr>
       <dsp:spPr>
         <a:xfrm>
-          <a:off x="580980" y="990"/>
-          <a:ext cx="539195" cy="575071"/>
+          <a:off x="514889" y="877"/>
+          <a:ext cx="477858" cy="509653"/>
         </a:xfrm>
         <a:prstGeom prst="roundRect">
           <a:avLst>
@@ -3198,12 +3198,12 @@
         </a:fontRef>
       </dsp:style>
       <dsp:txBody>
-        <a:bodyPr spcFirstLastPara="0" vert="horz" wrap="square" lIns="26670" tIns="26670" rIns="26670" bIns="26670" numCol="1" spcCol="1270" anchor="ctr" anchorCtr="0">
+        <a:bodyPr spcFirstLastPara="0" vert="horz" wrap="square" lIns="22860" tIns="22860" rIns="22860" bIns="22860" numCol="1" spcCol="1270" anchor="ctr" anchorCtr="0">
           <a:noAutofit/>
         </a:bodyPr>
         <a:lstStyle/>
         <a:p>
-          <a:pPr lvl="0" algn="ctr" defTabSz="311150">
+          <a:pPr lvl="0" algn="ctr" defTabSz="266700">
             <a:lnSpc>
               <a:spcPct val="90000"/>
             </a:lnSpc>
@@ -3215,15 +3215,15 @@
             </a:spcAft>
           </a:pPr>
           <a:r>
-            <a:rPr lang="en-US" sz="700" b="1" kern="1200" dirty="0" smtClean="0"/>
+            <a:rPr lang="en-US" sz="600" b="1" kern="1200" dirty="0" smtClean="0"/>
             <a:t>Apache NMS</a:t>
           </a:r>
-          <a:endParaRPr lang="en-US" sz="700" b="1" kern="1200" dirty="0"/>
+          <a:endParaRPr lang="en-US" sz="600" b="1" kern="1200" dirty="0"/>
         </a:p>
       </dsp:txBody>
       <dsp:txXfrm>
-        <a:off x="596772" y="16782"/>
-        <a:ext cx="507611" cy="543487"/>
+        <a:off x="528885" y="14873"/>
+        <a:ext cx="449866" cy="481661"/>
       </dsp:txXfrm>
     </dsp:sp>
     <dsp:sp modelId="{FFE394CF-3DCA-4408-B165-57E18D717540}">
@@ -3233,8 +3233,8 @@
       </dsp:nvSpPr>
       <dsp:spPr>
         <a:xfrm>
-          <a:off x="1131499" y="990"/>
-          <a:ext cx="539195" cy="575071"/>
+          <a:off x="1002783" y="877"/>
+          <a:ext cx="477858" cy="509653"/>
         </a:xfrm>
         <a:prstGeom prst="roundRect">
           <a:avLst>
@@ -3301,12 +3301,12 @@
         </a:fontRef>
       </dsp:style>
       <dsp:txBody>
-        <a:bodyPr spcFirstLastPara="0" vert="horz" wrap="square" lIns="26670" tIns="26670" rIns="26670" bIns="26670" numCol="1" spcCol="1270" anchor="ctr" anchorCtr="0">
+        <a:bodyPr spcFirstLastPara="0" vert="horz" wrap="square" lIns="22860" tIns="22860" rIns="22860" bIns="22860" numCol="1" spcCol="1270" anchor="ctr" anchorCtr="0">
           <a:noAutofit/>
         </a:bodyPr>
         <a:lstStyle/>
         <a:p>
-          <a:pPr lvl="0" algn="ctr" defTabSz="311150">
+          <a:pPr lvl="0" algn="ctr" defTabSz="266700">
             <a:lnSpc>
               <a:spcPct val="90000"/>
             </a:lnSpc>
@@ -3318,19 +3318,19 @@
             </a:spcAft>
           </a:pPr>
           <a:r>
-            <a:rPr lang="en-US" sz="700" b="1" kern="1200" dirty="0" err="1" smtClean="0"/>
+            <a:rPr lang="en-US" sz="600" b="1" kern="1200" dirty="0" err="1" smtClean="0"/>
             <a:t>Tibco</a:t>
           </a:r>
           <a:r>
-            <a:rPr lang="en-US" sz="700" b="1" kern="1200" dirty="0" smtClean="0"/>
+            <a:rPr lang="en-US" sz="600" b="1" kern="1200" dirty="0" smtClean="0"/>
             <a:t> EMS</a:t>
           </a:r>
-          <a:endParaRPr lang="en-US" sz="700" b="1" kern="1200" dirty="0"/>
+          <a:endParaRPr lang="en-US" sz="600" b="1" kern="1200" dirty="0"/>
         </a:p>
       </dsp:txBody>
       <dsp:txXfrm>
-        <a:off x="1147291" y="16782"/>
-        <a:ext cx="507611" cy="543487"/>
+        <a:off x="1016779" y="14873"/>
+        <a:ext cx="449866" cy="481661"/>
       </dsp:txXfrm>
     </dsp:sp>
     <dsp:sp modelId="{2E7C93F5-ED21-477F-8E2E-613C88FB1A81}">
@@ -3340,8 +3340,8 @@
       </dsp:nvSpPr>
       <dsp:spPr>
         <a:xfrm>
-          <a:off x="1693341" y="660417"/>
-          <a:ext cx="1640234" cy="560982"/>
+          <a:off x="1500712" y="585290"/>
+          <a:ext cx="1453646" cy="497167"/>
         </a:xfrm>
         <a:prstGeom prst="roundRect">
           <a:avLst>
@@ -3408,12 +3408,12 @@
         </a:fontRef>
       </dsp:style>
       <dsp:txBody>
-        <a:bodyPr spcFirstLastPara="0" vert="horz" wrap="square" lIns="26670" tIns="26670" rIns="26670" bIns="26670" numCol="1" spcCol="1270" anchor="ctr" anchorCtr="0">
+        <a:bodyPr spcFirstLastPara="0" vert="horz" wrap="square" lIns="22860" tIns="22860" rIns="22860" bIns="22860" numCol="1" spcCol="1270" anchor="ctr" anchorCtr="0">
           <a:noAutofit/>
         </a:bodyPr>
         <a:lstStyle/>
         <a:p>
-          <a:pPr lvl="0" algn="ctr" defTabSz="311150">
+          <a:pPr lvl="0" algn="ctr" defTabSz="266700">
             <a:lnSpc>
               <a:spcPct val="90000"/>
             </a:lnSpc>
@@ -3425,12 +3425,12 @@
             </a:spcAft>
           </a:pPr>
           <a:r>
-            <a:rPr lang="en-US" sz="700" b="1" kern="1200" dirty="0" smtClean="0"/>
+            <a:rPr lang="en-US" sz="600" b="1" kern="1200" dirty="0" smtClean="0"/>
             <a:t>Services</a:t>
           </a:r>
         </a:p>
         <a:p>
-          <a:pPr lvl="0" algn="ctr" defTabSz="311150">
+          <a:pPr lvl="0" algn="ctr" defTabSz="266700">
             <a:lnSpc>
               <a:spcPct val="90000"/>
             </a:lnSpc>
@@ -3442,15 +3442,15 @@
             </a:spcAft>
           </a:pPr>
           <a:r>
-            <a:rPr lang="en-US" sz="700" b="1" kern="1200" dirty="0" smtClean="0"/>
+            <a:rPr lang="en-US" sz="600" b="1" kern="1200" dirty="0" smtClean="0"/>
             <a:t>(portable Service Abstractions)</a:t>
           </a:r>
-          <a:endParaRPr lang="en-US" sz="700" b="1" kern="1200" dirty="0"/>
+          <a:endParaRPr lang="en-US" sz="600" b="1" kern="1200" dirty="0"/>
         </a:p>
       </dsp:txBody>
       <dsp:txXfrm>
-        <a:off x="1709772" y="676848"/>
-        <a:ext cx="1607372" cy="528120"/>
+        <a:off x="1515274" y="599852"/>
+        <a:ext cx="1424522" cy="468043"/>
       </dsp:txXfrm>
     </dsp:sp>
     <dsp:sp modelId="{BCBF89E4-DBB2-45AB-A8CD-2060C7BFAD25}">
@@ -3460,8 +3460,8 @@
       </dsp:nvSpPr>
       <dsp:spPr>
         <a:xfrm>
-          <a:off x="1693341" y="990"/>
-          <a:ext cx="539195" cy="575071"/>
+          <a:off x="1500712" y="877"/>
+          <a:ext cx="477858" cy="509653"/>
         </a:xfrm>
         <a:prstGeom prst="roundRect">
           <a:avLst>
@@ -3528,12 +3528,12 @@
         </a:fontRef>
       </dsp:style>
       <dsp:txBody>
-        <a:bodyPr spcFirstLastPara="0" vert="horz" wrap="square" lIns="26670" tIns="26670" rIns="26670" bIns="26670" numCol="1" spcCol="1270" anchor="ctr" anchorCtr="0">
+        <a:bodyPr spcFirstLastPara="0" vert="horz" wrap="square" lIns="22860" tIns="22860" rIns="22860" bIns="22860" numCol="1" spcCol="1270" anchor="ctr" anchorCtr="0">
           <a:noAutofit/>
         </a:bodyPr>
         <a:lstStyle/>
         <a:p>
-          <a:pPr lvl="0" algn="ctr" defTabSz="311150">
+          <a:pPr lvl="0" algn="ctr" defTabSz="266700">
             <a:lnSpc>
               <a:spcPct val="90000"/>
             </a:lnSpc>
@@ -3545,15 +3545,15 @@
             </a:spcAft>
           </a:pPr>
           <a:r>
-            <a:rPr lang="en-US" sz="700" b="1" kern="1200" dirty="0" smtClean="0"/>
+            <a:rPr lang="en-US" sz="600" b="1" kern="1200" dirty="0" smtClean="0"/>
             <a:t>Enterprise Services</a:t>
           </a:r>
-          <a:endParaRPr lang="en-US" sz="700" b="1" kern="1200" dirty="0"/>
+          <a:endParaRPr lang="en-US" sz="600" b="1" kern="1200" dirty="0"/>
         </a:p>
       </dsp:txBody>
       <dsp:txXfrm>
-        <a:off x="1709133" y="16782"/>
-        <a:ext cx="507611" cy="543487"/>
+        <a:off x="1514708" y="14873"/>
+        <a:ext cx="449866" cy="481661"/>
       </dsp:txXfrm>
     </dsp:sp>
     <dsp:sp modelId="{638CF1E5-C103-4121-A71C-C769EAA6DED4}">
@@ -3563,8 +3563,8 @@
       </dsp:nvSpPr>
       <dsp:spPr>
         <a:xfrm>
-          <a:off x="2243860" y="990"/>
-          <a:ext cx="539195" cy="575071"/>
+          <a:off x="1988606" y="877"/>
+          <a:ext cx="477858" cy="509653"/>
         </a:xfrm>
         <a:prstGeom prst="roundRect">
           <a:avLst>
@@ -3631,12 +3631,12 @@
         </a:fontRef>
       </dsp:style>
       <dsp:txBody>
-        <a:bodyPr spcFirstLastPara="0" vert="horz" wrap="square" lIns="26670" tIns="26670" rIns="26670" bIns="26670" numCol="1" spcCol="1270" anchor="ctr" anchorCtr="0">
+        <a:bodyPr spcFirstLastPara="0" vert="horz" wrap="square" lIns="22860" tIns="22860" rIns="22860" bIns="22860" numCol="1" spcCol="1270" anchor="ctr" anchorCtr="0">
           <a:noAutofit/>
         </a:bodyPr>
         <a:lstStyle/>
         <a:p>
-          <a:pPr lvl="0" algn="ctr" defTabSz="311150">
+          <a:pPr lvl="0" algn="ctr" defTabSz="266700">
             <a:lnSpc>
               <a:spcPct val="90000"/>
             </a:lnSpc>
@@ -3648,15 +3648,15 @@
             </a:spcAft>
           </a:pPr>
           <a:r>
-            <a:rPr lang="en-US" sz="700" b="1" kern="1200" dirty="0" smtClean="0"/>
+            <a:rPr lang="en-US" sz="600" b="1" kern="1200" dirty="0" smtClean="0"/>
             <a:t>Web Services</a:t>
           </a:r>
-          <a:endParaRPr lang="en-US" sz="700" b="1" kern="1200" dirty="0"/>
+          <a:endParaRPr lang="en-US" sz="600" b="1" kern="1200" dirty="0"/>
         </a:p>
       </dsp:txBody>
       <dsp:txXfrm>
-        <a:off x="2259652" y="16782"/>
-        <a:ext cx="507611" cy="543487"/>
+        <a:off x="2002602" y="14873"/>
+        <a:ext cx="449866" cy="481661"/>
       </dsp:txXfrm>
     </dsp:sp>
     <dsp:sp modelId="{371099FD-B2A4-48AB-895C-6F144C272316}">
@@ -3666,8 +3666,8 @@
       </dsp:nvSpPr>
       <dsp:spPr>
         <a:xfrm>
-          <a:off x="2794379" y="990"/>
-          <a:ext cx="539195" cy="575071"/>
+          <a:off x="2476500" y="877"/>
+          <a:ext cx="477858" cy="509653"/>
         </a:xfrm>
         <a:prstGeom prst="roundRect">
           <a:avLst>
@@ -3734,12 +3734,12 @@
         </a:fontRef>
       </dsp:style>
       <dsp:txBody>
-        <a:bodyPr spcFirstLastPara="0" vert="horz" wrap="square" lIns="26670" tIns="26670" rIns="26670" bIns="26670" numCol="1" spcCol="1270" anchor="ctr" anchorCtr="0">
+        <a:bodyPr spcFirstLastPara="0" vert="horz" wrap="square" lIns="22860" tIns="22860" rIns="22860" bIns="22860" numCol="1" spcCol="1270" anchor="ctr" anchorCtr="0">
           <a:noAutofit/>
         </a:bodyPr>
         <a:lstStyle/>
         <a:p>
-          <a:pPr lvl="0" algn="ctr" defTabSz="311150">
+          <a:pPr lvl="0" algn="ctr" defTabSz="266700">
             <a:lnSpc>
               <a:spcPct val="90000"/>
             </a:lnSpc>
@@ -3751,15 +3751,15 @@
             </a:spcAft>
           </a:pPr>
           <a:r>
-            <a:rPr lang="en-US" sz="700" b="1" kern="1200" dirty="0" smtClean="0"/>
+            <a:rPr lang="en-US" sz="600" b="1" kern="1200" dirty="0" smtClean="0"/>
             <a:t>WCF Services</a:t>
           </a:r>
-          <a:endParaRPr lang="en-US" sz="700" b="1" kern="1200" dirty="0"/>
+          <a:endParaRPr lang="en-US" sz="600" b="1" kern="1200" dirty="0"/>
         </a:p>
       </dsp:txBody>
       <dsp:txXfrm>
-        <a:off x="2810171" y="16782"/>
-        <a:ext cx="507611" cy="543487"/>
+        <a:off x="2490496" y="14873"/>
+        <a:ext cx="449866" cy="481661"/>
       </dsp:txXfrm>
     </dsp:sp>
     <dsp:sp modelId="{B3D51C00-3C40-4325-8E4D-C64B64A0A4F1}">
@@ -3769,8 +3769,8 @@
       </dsp:nvSpPr>
       <dsp:spPr>
         <a:xfrm>
-          <a:off x="3356221" y="660417"/>
-          <a:ext cx="539195" cy="560982"/>
+          <a:off x="2974428" y="585290"/>
+          <a:ext cx="477858" cy="497167"/>
         </a:xfrm>
         <a:prstGeom prst="roundRect">
           <a:avLst>
@@ -3837,12 +3837,12 @@
         </a:fontRef>
       </dsp:style>
       <dsp:txBody>
-        <a:bodyPr spcFirstLastPara="0" vert="horz" wrap="square" lIns="26670" tIns="26670" rIns="26670" bIns="26670" numCol="1" spcCol="1270" anchor="ctr" anchorCtr="0">
+        <a:bodyPr spcFirstLastPara="0" vert="horz" wrap="square" lIns="22860" tIns="22860" rIns="22860" bIns="22860" numCol="1" spcCol="1270" anchor="ctr" anchorCtr="0">
           <a:noAutofit/>
         </a:bodyPr>
         <a:lstStyle/>
         <a:p>
-          <a:pPr lvl="0" algn="ctr" defTabSz="311150">
+          <a:pPr lvl="0" algn="ctr" defTabSz="266700">
             <a:lnSpc>
               <a:spcPct val="90000"/>
             </a:lnSpc>
@@ -3854,15 +3854,15 @@
             </a:spcAft>
           </a:pPr>
           <a:r>
-            <a:rPr lang="en-US" sz="700" b="1" kern="1200" dirty="0" smtClean="0"/>
+            <a:rPr lang="en-US" sz="600" b="1" kern="1200" dirty="0" smtClean="0"/>
             <a:t>Web</a:t>
           </a:r>
-          <a:endParaRPr lang="en-US" sz="700" b="1" kern="1200" dirty="0"/>
+          <a:endParaRPr lang="en-US" sz="600" b="1" kern="1200" dirty="0"/>
         </a:p>
       </dsp:txBody>
       <dsp:txXfrm>
-        <a:off x="3372013" y="676209"/>
-        <a:ext cx="507611" cy="529398"/>
+        <a:off x="2988424" y="599286"/>
+        <a:ext cx="449866" cy="469175"/>
       </dsp:txXfrm>
     </dsp:sp>
     <dsp:sp modelId="{1500228F-2E62-44DE-878F-B101E1CA0A1F}">
@@ -3872,8 +3872,8 @@
       </dsp:nvSpPr>
       <dsp:spPr>
         <a:xfrm>
-          <a:off x="3356221" y="990"/>
-          <a:ext cx="539195" cy="575071"/>
+          <a:off x="2974428" y="877"/>
+          <a:ext cx="477858" cy="509653"/>
         </a:xfrm>
         <a:prstGeom prst="roundRect">
           <a:avLst>
@@ -3940,12 +3940,12 @@
         </a:fontRef>
       </dsp:style>
       <dsp:txBody>
-        <a:bodyPr spcFirstLastPara="0" vert="horz" wrap="square" lIns="26670" tIns="26670" rIns="26670" bIns="26670" numCol="1" spcCol="1270" anchor="ctr" anchorCtr="0">
+        <a:bodyPr spcFirstLastPara="0" vert="horz" wrap="square" lIns="22860" tIns="22860" rIns="22860" bIns="22860" numCol="1" spcCol="1270" anchor="ctr" anchorCtr="0">
           <a:noAutofit/>
         </a:bodyPr>
         <a:lstStyle/>
         <a:p>
-          <a:pPr lvl="0" algn="ctr" defTabSz="311150">
+          <a:pPr lvl="0" algn="ctr" defTabSz="266700">
             <a:lnSpc>
               <a:spcPct val="90000"/>
             </a:lnSpc>
@@ -3957,15 +3957,15 @@
             </a:spcAft>
           </a:pPr>
           <a:r>
-            <a:rPr lang="en-US" sz="700" b="1" kern="1200" dirty="0" smtClean="0"/>
+            <a:rPr lang="en-US" sz="600" b="1" kern="1200" dirty="0" smtClean="0"/>
             <a:t>MVC</a:t>
           </a:r>
-          <a:endParaRPr lang="en-US" sz="700" b="1" kern="1200" dirty="0"/>
+          <a:endParaRPr lang="en-US" sz="600" b="1" kern="1200" dirty="0"/>
         </a:p>
       </dsp:txBody>
       <dsp:txXfrm>
-        <a:off x="3372013" y="16782"/>
-        <a:ext cx="507611" cy="543487"/>
+        <a:off x="2988424" y="14873"/>
+        <a:ext cx="449866" cy="481661"/>
       </dsp:txXfrm>
     </dsp:sp>
     <dsp:sp modelId="{0D40EAD2-4AEB-42A7-8D57-4B8D39FC1629}">
@@ -3975,8 +3975,8 @@
       </dsp:nvSpPr>
       <dsp:spPr>
         <a:xfrm>
-          <a:off x="3918063" y="660417"/>
-          <a:ext cx="1089715" cy="560982"/>
+          <a:off x="3472357" y="585290"/>
+          <a:ext cx="965752" cy="497167"/>
         </a:xfrm>
         <a:prstGeom prst="roundRect">
           <a:avLst>
@@ -4043,12 +4043,12 @@
         </a:fontRef>
       </dsp:style>
       <dsp:txBody>
-        <a:bodyPr spcFirstLastPara="0" vert="horz" wrap="square" lIns="26670" tIns="26670" rIns="26670" bIns="26670" numCol="1" spcCol="1270" anchor="ctr" anchorCtr="0">
+        <a:bodyPr spcFirstLastPara="0" vert="horz" wrap="square" lIns="22860" tIns="22860" rIns="22860" bIns="22860" numCol="1" spcCol="1270" anchor="ctr" anchorCtr="0">
           <a:noAutofit/>
         </a:bodyPr>
         <a:lstStyle/>
         <a:p>
-          <a:pPr lvl="0" algn="ctr" defTabSz="311150">
+          <a:pPr lvl="0" algn="ctr" defTabSz="266700">
             <a:lnSpc>
               <a:spcPct val="90000"/>
             </a:lnSpc>
@@ -4060,15 +4060,15 @@
             </a:spcAft>
           </a:pPr>
           <a:r>
-            <a:rPr lang="en-US" sz="700" b="1" kern="1200" dirty="0" smtClean="0"/>
+            <a:rPr lang="en-US" sz="600" b="1" kern="1200" dirty="0" smtClean="0"/>
             <a:t>Unit Testing</a:t>
           </a:r>
-          <a:endParaRPr lang="en-US" sz="700" b="1" kern="1200" dirty="0"/>
+          <a:endParaRPr lang="en-US" sz="600" b="1" kern="1200" dirty="0"/>
         </a:p>
       </dsp:txBody>
       <dsp:txXfrm>
-        <a:off x="3934494" y="676848"/>
-        <a:ext cx="1056853" cy="528120"/>
+        <a:off x="3486919" y="599852"/>
+        <a:ext cx="936628" cy="468043"/>
       </dsp:txXfrm>
     </dsp:sp>
     <dsp:sp modelId="{F0824C2F-0742-41F2-BDCB-3CCB19CA456B}">
@@ -4078,8 +4078,8 @@
       </dsp:nvSpPr>
       <dsp:spPr>
         <a:xfrm>
-          <a:off x="3918063" y="990"/>
-          <a:ext cx="539195" cy="575071"/>
+          <a:off x="3472357" y="877"/>
+          <a:ext cx="477858" cy="509653"/>
         </a:xfrm>
         <a:prstGeom prst="roundRect">
           <a:avLst>
@@ -4146,12 +4146,12 @@
         </a:fontRef>
       </dsp:style>
       <dsp:txBody>
-        <a:bodyPr spcFirstLastPara="0" vert="horz" wrap="square" lIns="26670" tIns="26670" rIns="26670" bIns="26670" numCol="1" spcCol="1270" anchor="ctr" anchorCtr="0">
+        <a:bodyPr spcFirstLastPara="0" vert="horz" wrap="square" lIns="22860" tIns="22860" rIns="22860" bIns="22860" numCol="1" spcCol="1270" anchor="ctr" anchorCtr="0">
           <a:noAutofit/>
         </a:bodyPr>
         <a:lstStyle/>
         <a:p>
-          <a:pPr lvl="0" algn="ctr" defTabSz="311150">
+          <a:pPr lvl="0" algn="ctr" defTabSz="266700">
             <a:lnSpc>
               <a:spcPct val="90000"/>
             </a:lnSpc>
@@ -4163,15 +4163,15 @@
             </a:spcAft>
           </a:pPr>
           <a:r>
-            <a:rPr lang="en-US" sz="700" b="1" kern="1200" dirty="0" err="1" smtClean="0"/>
+            <a:rPr lang="en-US" sz="600" b="1" kern="1200" dirty="0" err="1" smtClean="0"/>
             <a:t>NUnit</a:t>
           </a:r>
-          <a:endParaRPr lang="en-US" sz="700" b="1" kern="1200" dirty="0"/>
+          <a:endParaRPr lang="en-US" sz="600" b="1" kern="1200" dirty="0"/>
         </a:p>
       </dsp:txBody>
       <dsp:txXfrm>
-        <a:off x="3933855" y="16782"/>
-        <a:ext cx="507611" cy="543487"/>
+        <a:off x="3486353" y="14873"/>
+        <a:ext cx="449866" cy="481661"/>
       </dsp:txXfrm>
     </dsp:sp>
     <dsp:sp modelId="{925A6B94-DAC2-4653-B6B3-36F0F2B1C7D8}">
@@ -4181,8 +4181,8 @@
       </dsp:nvSpPr>
       <dsp:spPr>
         <a:xfrm>
-          <a:off x="4468582" y="990"/>
-          <a:ext cx="539195" cy="575071"/>
+          <a:off x="3960251" y="877"/>
+          <a:ext cx="477858" cy="509653"/>
         </a:xfrm>
         <a:prstGeom prst="roundRect">
           <a:avLst>
@@ -4249,12 +4249,12 @@
         </a:fontRef>
       </dsp:style>
       <dsp:txBody>
-        <a:bodyPr spcFirstLastPara="0" vert="horz" wrap="square" lIns="26670" tIns="26670" rIns="26670" bIns="26670" numCol="1" spcCol="1270" anchor="ctr" anchorCtr="0">
+        <a:bodyPr spcFirstLastPara="0" vert="horz" wrap="square" lIns="22860" tIns="22860" rIns="22860" bIns="22860" numCol="1" spcCol="1270" anchor="ctr" anchorCtr="0">
           <a:noAutofit/>
         </a:bodyPr>
         <a:lstStyle/>
         <a:p>
-          <a:pPr lvl="0" algn="ctr" defTabSz="311150">
+          <a:pPr lvl="0" algn="ctr" defTabSz="266700">
             <a:lnSpc>
               <a:spcPct val="90000"/>
             </a:lnSpc>
@@ -4266,15 +4266,15 @@
             </a:spcAft>
           </a:pPr>
           <a:r>
-            <a:rPr lang="en-US" sz="700" b="1" kern="1200" dirty="0" err="1" smtClean="0"/>
+            <a:rPr lang="en-US" sz="600" b="1" kern="1200" dirty="0" err="1" smtClean="0"/>
             <a:t>MSTest</a:t>
           </a:r>
-          <a:endParaRPr lang="en-US" sz="700" b="1" kern="1200" dirty="0"/>
+          <a:endParaRPr lang="en-US" sz="600" b="1" kern="1200" dirty="0"/>
         </a:p>
       </dsp:txBody>
       <dsp:txXfrm>
-        <a:off x="4484374" y="16782"/>
-        <a:ext cx="507611" cy="543487"/>
+        <a:off x="3974247" y="14873"/>
+        <a:ext cx="449866" cy="481661"/>
       </dsp:txXfrm>
     </dsp:sp>
     <dsp:sp modelId="{8C3829DD-8FFE-4BA6-868E-9E469F4CE910}">
@@ -4284,8 +4284,8 @@
       </dsp:nvSpPr>
       <dsp:spPr>
         <a:xfrm>
-          <a:off x="5030425" y="660435"/>
-          <a:ext cx="539195" cy="560965"/>
+          <a:off x="4458180" y="585306"/>
+          <a:ext cx="477858" cy="497151"/>
         </a:xfrm>
         <a:prstGeom prst="roundRect">
           <a:avLst>
@@ -4352,12 +4352,12 @@
         </a:fontRef>
       </dsp:style>
       <dsp:txBody>
-        <a:bodyPr spcFirstLastPara="0" vert="horz" wrap="square" lIns="26670" tIns="26670" rIns="26670" bIns="26670" numCol="1" spcCol="1270" anchor="ctr" anchorCtr="0">
+        <a:bodyPr spcFirstLastPara="0" vert="horz" wrap="square" lIns="22860" tIns="22860" rIns="22860" bIns="22860" numCol="1" spcCol="1270" anchor="ctr" anchorCtr="0">
           <a:noAutofit/>
         </a:bodyPr>
         <a:lstStyle/>
         <a:p>
-          <a:pPr lvl="0" algn="ctr" defTabSz="311150">
+          <a:pPr lvl="0" algn="ctr" defTabSz="266700">
             <a:lnSpc>
               <a:spcPct val="90000"/>
             </a:lnSpc>
@@ -4369,15 +4369,15 @@
             </a:spcAft>
           </a:pPr>
           <a:r>
-            <a:rPr lang="en-US" sz="700" b="1" kern="1200" dirty="0" smtClean="0"/>
+            <a:rPr lang="en-US" sz="600" b="1" kern="1200" dirty="0" smtClean="0"/>
             <a:t>Scheduling</a:t>
           </a:r>
-          <a:endParaRPr lang="en-US" sz="700" b="1" kern="1200" dirty="0"/>
+          <a:endParaRPr lang="en-US" sz="600" b="1" kern="1200" dirty="0"/>
         </a:p>
       </dsp:txBody>
       <dsp:txXfrm>
-        <a:off x="5046217" y="676227"/>
-        <a:ext cx="507611" cy="529381"/>
+        <a:off x="4472176" y="599302"/>
+        <a:ext cx="449866" cy="469159"/>
       </dsp:txXfrm>
     </dsp:sp>
     <dsp:sp modelId="{A4B2F885-5B2B-4F44-9732-1F81B13F2C63}">
@@ -4387,8 +4387,8 @@
       </dsp:nvSpPr>
       <dsp:spPr>
         <a:xfrm>
-          <a:off x="5030425" y="1007"/>
-          <a:ext cx="539195" cy="575071"/>
+          <a:off x="4458180" y="893"/>
+          <a:ext cx="477858" cy="509653"/>
         </a:xfrm>
         <a:prstGeom prst="roundRect">
           <a:avLst>
@@ -4455,12 +4455,12 @@
         </a:fontRef>
       </dsp:style>
       <dsp:txBody>
-        <a:bodyPr spcFirstLastPara="0" vert="horz" wrap="square" lIns="26670" tIns="26670" rIns="26670" bIns="26670" numCol="1" spcCol="1270" anchor="ctr" anchorCtr="0">
+        <a:bodyPr spcFirstLastPara="0" vert="horz" wrap="square" lIns="22860" tIns="22860" rIns="22860" bIns="22860" numCol="1" spcCol="1270" anchor="ctr" anchorCtr="0">
           <a:noAutofit/>
         </a:bodyPr>
         <a:lstStyle/>
         <a:p>
-          <a:pPr lvl="0" algn="ctr" defTabSz="311150">
+          <a:pPr lvl="0" algn="ctr" defTabSz="266700">
             <a:lnSpc>
               <a:spcPct val="90000"/>
             </a:lnSpc>
@@ -4472,15 +4472,15 @@
             </a:spcAft>
           </a:pPr>
           <a:r>
-            <a:rPr lang="en-US" sz="700" b="1" kern="1200" dirty="0" smtClean="0"/>
+            <a:rPr lang="en-US" sz="600" b="1" kern="1200" dirty="0" smtClean="0"/>
             <a:t>Quartz.NET</a:t>
           </a:r>
-          <a:endParaRPr lang="en-US" sz="700" b="1" kern="1200" dirty="0"/>
+          <a:endParaRPr lang="en-US" sz="600" b="1" kern="1200" dirty="0"/>
         </a:p>
       </dsp:txBody>
       <dsp:txXfrm>
-        <a:off x="5046217" y="16799"/>
-        <a:ext cx="507611" cy="543487"/>
+        <a:off x="4472176" y="14889"/>
+        <a:ext cx="449866" cy="481661"/>
       </dsp:txXfrm>
     </dsp:sp>
   </dsp:spTree>
@@ -6225,7 +6225,7 @@
           <a:p>
             <a:fld id="{26DBE603-533E-4737-AE73-374D5409AD06}" type="datetimeFigureOut">
               <a:rPr lang="en-US" smtClean="0"/>
-              <a:t>12/9/2010</a:t>
+              <a:t>12/10/2010</a:t>
             </a:fld>
             <a:endParaRPr lang="en-US"/>
           </a:p>
@@ -6395,7 +6395,7 @@
           <a:p>
             <a:fld id="{26DBE603-533E-4737-AE73-374D5409AD06}" type="datetimeFigureOut">
               <a:rPr lang="en-US" smtClean="0"/>
-              <a:t>12/9/2010</a:t>
+              <a:t>12/10/2010</a:t>
             </a:fld>
             <a:endParaRPr lang="en-US"/>
           </a:p>
@@ -6575,7 +6575,7 @@
           <a:p>
             <a:fld id="{26DBE603-533E-4737-AE73-374D5409AD06}" type="datetimeFigureOut">
               <a:rPr lang="en-US" smtClean="0"/>
-              <a:t>12/9/2010</a:t>
+              <a:t>12/10/2010</a:t>
             </a:fld>
             <a:endParaRPr lang="en-US"/>
           </a:p>
@@ -6745,7 +6745,7 @@
           <a:p>
             <a:fld id="{26DBE603-533E-4737-AE73-374D5409AD06}" type="datetimeFigureOut">
               <a:rPr lang="en-US" smtClean="0"/>
-              <a:t>12/9/2010</a:t>
+              <a:t>12/10/2010</a:t>
             </a:fld>
             <a:endParaRPr lang="en-US"/>
           </a:p>
@@ -6991,7 +6991,7 @@
           <a:p>
             <a:fld id="{26DBE603-533E-4737-AE73-374D5409AD06}" type="datetimeFigureOut">
               <a:rPr lang="en-US" smtClean="0"/>
-              <a:t>12/9/2010</a:t>
+              <a:t>12/10/2010</a:t>
             </a:fld>
             <a:endParaRPr lang="en-US"/>
           </a:p>
@@ -7279,7 +7279,7 @@
           <a:p>
             <a:fld id="{26DBE603-533E-4737-AE73-374D5409AD06}" type="datetimeFigureOut">
               <a:rPr lang="en-US" smtClean="0"/>
-              <a:t>12/9/2010</a:t>
+              <a:t>12/10/2010</a:t>
             </a:fld>
             <a:endParaRPr lang="en-US"/>
           </a:p>
@@ -7701,7 +7701,7 @@
           <a:p>
             <a:fld id="{26DBE603-533E-4737-AE73-374D5409AD06}" type="datetimeFigureOut">
               <a:rPr lang="en-US" smtClean="0"/>
-              <a:t>12/9/2010</a:t>
+              <a:t>12/10/2010</a:t>
             </a:fld>
             <a:endParaRPr lang="en-US"/>
           </a:p>
@@ -7819,7 +7819,7 @@
           <a:p>
             <a:fld id="{26DBE603-533E-4737-AE73-374D5409AD06}" type="datetimeFigureOut">
               <a:rPr lang="en-US" smtClean="0"/>
-              <a:t>12/9/2010</a:t>
+              <a:t>12/10/2010</a:t>
             </a:fld>
             <a:endParaRPr lang="en-US"/>
           </a:p>
@@ -7914,7 +7914,7 @@
           <a:p>
             <a:fld id="{26DBE603-533E-4737-AE73-374D5409AD06}" type="datetimeFigureOut">
               <a:rPr lang="en-US" smtClean="0"/>
-              <a:t>12/9/2010</a:t>
+              <a:t>12/10/2010</a:t>
             </a:fld>
             <a:endParaRPr lang="en-US"/>
           </a:p>
@@ -8191,7 +8191,7 @@
           <a:p>
             <a:fld id="{26DBE603-533E-4737-AE73-374D5409AD06}" type="datetimeFigureOut">
               <a:rPr lang="en-US" smtClean="0"/>
-              <a:t>12/9/2010</a:t>
+              <a:t>12/10/2010</a:t>
             </a:fld>
             <a:endParaRPr lang="en-US"/>
           </a:p>
@@ -8444,7 +8444,7 @@
           <a:p>
             <a:fld id="{26DBE603-533E-4737-AE73-374D5409AD06}" type="datetimeFigureOut">
               <a:rPr lang="en-US" smtClean="0"/>
-              <a:t>12/9/2010</a:t>
+              <a:t>12/10/2010</a:t>
             </a:fld>
             <a:endParaRPr lang="en-US"/>
           </a:p>
@@ -8657,7 +8657,7 @@
           <a:p>
             <a:fld id="{26DBE603-533E-4737-AE73-374D5409AD06}" type="datetimeFigureOut">
               <a:rPr lang="en-US" smtClean="0"/>
-              <a:t>12/9/2010</a:t>
+              <a:t>12/10/2010</a:t>
             </a:fld>
             <a:endParaRPr lang="en-US"/>
           </a:p>
@@ -9039,14 +9039,14 @@
           <p:nvPr>
             <p:extLst>
               <p:ext uri="{D42A27DB-BD31-4B8C-83A1-F6EECF244321}">
-                <p14:modId xmlns:p14="http://schemas.microsoft.com/office/powerpoint/2010/main" val="4083516530"/>
+                <p14:modId xmlns:p14="http://schemas.microsoft.com/office/powerpoint/2010/main" val="413697764"/>
               </p:ext>
             </p:extLst>
           </p:nvPr>
         </p:nvGraphicFramePr>
         <p:xfrm>
-          <a:off x="1421641" y="2362200"/>
-          <a:ext cx="5588759" cy="2133600"/>
+          <a:off x="1066801" y="2604910"/>
+          <a:ext cx="4953000" cy="1890889"/>
         </p:xfrm>
         <a:graphic>
           <a:graphicData uri="http://schemas.openxmlformats.org/drawingml/2006/diagram">

</xml_diff>